<commit_message>
presentation version, added search function
</commit_message>
<xml_diff>
--- a/presentation.pptx
+++ b/presentation.pptx
@@ -10,13 +10,15 @@
     <p:sldId id="258" r:id="rId4"/>
     <p:sldId id="263" r:id="rId5"/>
     <p:sldId id="259" r:id="rId6"/>
-    <p:sldId id="261" r:id="rId7"/>
-    <p:sldId id="265" r:id="rId8"/>
-    <p:sldId id="266" r:id="rId9"/>
-    <p:sldId id="267" r:id="rId10"/>
-    <p:sldId id="268" r:id="rId11"/>
-    <p:sldId id="269" r:id="rId12"/>
-    <p:sldId id="260" r:id="rId13"/>
+    <p:sldId id="270" r:id="rId7"/>
+    <p:sldId id="261" r:id="rId8"/>
+    <p:sldId id="271" r:id="rId9"/>
+    <p:sldId id="265" r:id="rId10"/>
+    <p:sldId id="266" r:id="rId11"/>
+    <p:sldId id="267" r:id="rId12"/>
+    <p:sldId id="268" r:id="rId13"/>
+    <p:sldId id="269" r:id="rId14"/>
+    <p:sldId id="260" r:id="rId15"/>
   </p:sldIdLst>
   <p:sldSz cx="12192000" cy="6858000"/>
   <p:notesSz cx="6858000" cy="9144000"/>
@@ -7923,7 +7925,7 @@
           <a:p>
             <a:fld id="{AB07D4FF-0896-429F-AD6E-7C1F988165BB}" type="datetimeFigureOut">
               <a:rPr lang="en-US" smtClean="0"/>
-              <a:t>7/8/2019</a:t>
+              <a:t>7/9/2019</a:t>
             </a:fld>
             <a:endParaRPr lang="en-US"/>
           </a:p>
@@ -8179,7 +8181,7 @@
           <a:p>
             <a:fld id="{AB07D4FF-0896-429F-AD6E-7C1F988165BB}" type="datetimeFigureOut">
               <a:rPr lang="en-US" smtClean="0"/>
-              <a:t>7/8/2019</a:t>
+              <a:t>7/9/2019</a:t>
             </a:fld>
             <a:endParaRPr lang="en-US"/>
           </a:p>
@@ -8493,7 +8495,7 @@
           <a:p>
             <a:fld id="{AB07D4FF-0896-429F-AD6E-7C1F988165BB}" type="datetimeFigureOut">
               <a:rPr lang="en-US" smtClean="0"/>
-              <a:t>7/8/2019</a:t>
+              <a:t>7/9/2019</a:t>
             </a:fld>
             <a:endParaRPr lang="en-US"/>
           </a:p>
@@ -8826,7 +8828,7 @@
           <a:p>
             <a:fld id="{AB07D4FF-0896-429F-AD6E-7C1F988165BB}" type="datetimeFigureOut">
               <a:rPr lang="en-US" smtClean="0"/>
-              <a:t>7/8/2019</a:t>
+              <a:t>7/9/2019</a:t>
             </a:fld>
             <a:endParaRPr lang="en-US"/>
           </a:p>
@@ -9140,7 +9142,7 @@
           <a:p>
             <a:fld id="{AB07D4FF-0896-429F-AD6E-7C1F988165BB}" type="datetimeFigureOut">
               <a:rPr lang="en-US" smtClean="0"/>
-              <a:t>7/8/2019</a:t>
+              <a:t>7/9/2019</a:t>
             </a:fld>
             <a:endParaRPr lang="en-US"/>
           </a:p>
@@ -9533,7 +9535,7 @@
           <a:p>
             <a:fld id="{AB07D4FF-0896-429F-AD6E-7C1F988165BB}" type="datetimeFigureOut">
               <a:rPr lang="en-US" smtClean="0"/>
-              <a:t>7/8/2019</a:t>
+              <a:t>7/9/2019</a:t>
             </a:fld>
             <a:endParaRPr lang="en-US"/>
           </a:p>
@@ -9703,7 +9705,7 @@
           <a:p>
             <a:fld id="{AB07D4FF-0896-429F-AD6E-7C1F988165BB}" type="datetimeFigureOut">
               <a:rPr lang="en-US" smtClean="0"/>
-              <a:t>7/8/2019</a:t>
+              <a:t>7/9/2019</a:t>
             </a:fld>
             <a:endParaRPr lang="en-US"/>
           </a:p>
@@ -9883,7 +9885,7 @@
           <a:p>
             <a:fld id="{AB07D4FF-0896-429F-AD6E-7C1F988165BB}" type="datetimeFigureOut">
               <a:rPr lang="en-US" smtClean="0"/>
-              <a:t>7/8/2019</a:t>
+              <a:t>7/9/2019</a:t>
             </a:fld>
             <a:endParaRPr lang="en-US"/>
           </a:p>
@@ -10053,7 +10055,7 @@
           <a:p>
             <a:fld id="{AB07D4FF-0896-429F-AD6E-7C1F988165BB}" type="datetimeFigureOut">
               <a:rPr lang="en-US" smtClean="0"/>
-              <a:t>7/8/2019</a:t>
+              <a:t>7/9/2019</a:t>
             </a:fld>
             <a:endParaRPr lang="en-US"/>
           </a:p>
@@ -10300,7 +10302,7 @@
           <a:p>
             <a:fld id="{AB07D4FF-0896-429F-AD6E-7C1F988165BB}" type="datetimeFigureOut">
               <a:rPr lang="en-US" smtClean="0"/>
-              <a:t>7/8/2019</a:t>
+              <a:t>7/9/2019</a:t>
             </a:fld>
             <a:endParaRPr lang="en-US"/>
           </a:p>
@@ -10532,7 +10534,7 @@
           <a:p>
             <a:fld id="{AB07D4FF-0896-429F-AD6E-7C1F988165BB}" type="datetimeFigureOut">
               <a:rPr lang="en-US" smtClean="0"/>
-              <a:t>7/8/2019</a:t>
+              <a:t>7/9/2019</a:t>
             </a:fld>
             <a:endParaRPr lang="en-US"/>
           </a:p>
@@ -10906,7 +10908,7 @@
           <a:p>
             <a:fld id="{AB07D4FF-0896-429F-AD6E-7C1F988165BB}" type="datetimeFigureOut">
               <a:rPr lang="en-US" smtClean="0"/>
-              <a:t>7/8/2019</a:t>
+              <a:t>7/9/2019</a:t>
             </a:fld>
             <a:endParaRPr lang="en-US"/>
           </a:p>
@@ -11029,7 +11031,7 @@
           <a:p>
             <a:fld id="{AB07D4FF-0896-429F-AD6E-7C1F988165BB}" type="datetimeFigureOut">
               <a:rPr lang="en-US" smtClean="0"/>
-              <a:t>7/8/2019</a:t>
+              <a:t>7/9/2019</a:t>
             </a:fld>
             <a:endParaRPr lang="en-US"/>
           </a:p>
@@ -11124,7 +11126,7 @@
           <a:p>
             <a:fld id="{AB07D4FF-0896-429F-AD6E-7C1F988165BB}" type="datetimeFigureOut">
               <a:rPr lang="en-US" smtClean="0"/>
-              <a:t>7/8/2019</a:t>
+              <a:t>7/9/2019</a:t>
             </a:fld>
             <a:endParaRPr lang="en-US"/>
           </a:p>
@@ -11384,7 +11386,7 @@
           <a:p>
             <a:fld id="{AB07D4FF-0896-429F-AD6E-7C1F988165BB}" type="datetimeFigureOut">
               <a:rPr lang="en-US" smtClean="0"/>
-              <a:t>7/8/2019</a:t>
+              <a:t>7/9/2019</a:t>
             </a:fld>
             <a:endParaRPr lang="en-US"/>
           </a:p>
@@ -11694,7 +11696,7 @@
           <a:p>
             <a:fld id="{AB07D4FF-0896-429F-AD6E-7C1F988165BB}" type="datetimeFigureOut">
               <a:rPr lang="en-US" smtClean="0"/>
-              <a:t>7/8/2019</a:t>
+              <a:t>7/9/2019</a:t>
             </a:fld>
             <a:endParaRPr lang="en-US"/>
           </a:p>
@@ -12396,7 +12398,7 @@
           <a:p>
             <a:fld id="{AB07D4FF-0896-429F-AD6E-7C1F988165BB}" type="datetimeFigureOut">
               <a:rPr lang="en-US" smtClean="0"/>
-              <a:t>7/8/2019</a:t>
+              <a:t>7/9/2019</a:t>
             </a:fld>
             <a:endParaRPr lang="en-US"/>
           </a:p>
@@ -13058,6 +13060,266 @@
                   <a:schemeClr val="tx1"/>
                 </a:solidFill>
               </a:rPr>
+              <a:t>What are the Most Popular Words in Title? N-Grams (N = 1)</a:t>
+            </a:r>
+            <a:endParaRPr lang="en-US" sz="2000" dirty="0"/>
+          </a:p>
+        </p:txBody>
+      </p:sp>
+      <p:graphicFrame>
+        <p:nvGraphicFramePr>
+          <p:cNvPr id="5" name="Chart 4">
+            <a:extLst>
+              <a:ext uri="{FF2B5EF4-FFF2-40B4-BE49-F238E27FC236}">
+                <a16:creationId xmlns:a16="http://schemas.microsoft.com/office/drawing/2014/main" id="{D9A3A95F-5B2C-44ED-93CA-5DB3C07D4760}"/>
+              </a:ext>
+            </a:extLst>
+          </p:cNvPr>
+          <p:cNvGraphicFramePr>
+            <a:graphicFrameLocks/>
+          </p:cNvGraphicFramePr>
+          <p:nvPr>
+            <p:extLst>
+              <p:ext uri="{D42A27DB-BD31-4B8C-83A1-F6EECF244321}">
+                <p14:modId xmlns:p14="http://schemas.microsoft.com/office/powerpoint/2010/main" val="1447746438"/>
+              </p:ext>
+            </p:extLst>
+          </p:nvPr>
+        </p:nvGraphicFramePr>
+        <p:xfrm>
+          <a:off x="677335" y="1647366"/>
+          <a:ext cx="4529147" cy="3951001"/>
+        </p:xfrm>
+        <a:graphic>
+          <a:graphicData uri="http://schemas.openxmlformats.org/drawingml/2006/chart">
+            <c:chart xmlns:c="http://schemas.openxmlformats.org/drawingml/2006/chart" xmlns:r="http://schemas.openxmlformats.org/officeDocument/2006/relationships" r:id="rId2"/>
+          </a:graphicData>
+        </a:graphic>
+      </p:graphicFrame>
+      <p:graphicFrame>
+        <p:nvGraphicFramePr>
+          <p:cNvPr id="6" name="Chart 5">
+            <a:extLst>
+              <a:ext uri="{FF2B5EF4-FFF2-40B4-BE49-F238E27FC236}">
+                <a16:creationId xmlns:a16="http://schemas.microsoft.com/office/drawing/2014/main" id="{F5BEA849-033A-498F-BF9F-A6C8CFF82B89}"/>
+              </a:ext>
+            </a:extLst>
+          </p:cNvPr>
+          <p:cNvGraphicFramePr>
+            <a:graphicFrameLocks/>
+          </p:cNvGraphicFramePr>
+          <p:nvPr>
+            <p:extLst>
+              <p:ext uri="{D42A27DB-BD31-4B8C-83A1-F6EECF244321}">
+                <p14:modId xmlns:p14="http://schemas.microsoft.com/office/powerpoint/2010/main" val="2239648938"/>
+              </p:ext>
+            </p:extLst>
+          </p:nvPr>
+        </p:nvGraphicFramePr>
+        <p:xfrm>
+          <a:off x="5206482" y="1647365"/>
+          <a:ext cx="4529149" cy="3951001"/>
+        </p:xfrm>
+        <a:graphic>
+          <a:graphicData uri="http://schemas.openxmlformats.org/drawingml/2006/chart">
+            <c:chart xmlns:c="http://schemas.openxmlformats.org/drawingml/2006/chart" xmlns:r="http://schemas.openxmlformats.org/officeDocument/2006/relationships" r:id="rId3"/>
+          </a:graphicData>
+        </a:graphic>
+      </p:graphicFrame>
+    </p:spTree>
+    <p:extLst>
+      <p:ext uri="{BB962C8B-B14F-4D97-AF65-F5344CB8AC3E}">
+        <p14:creationId xmlns:p14="http://schemas.microsoft.com/office/powerpoint/2010/main" val="3151245089"/>
+      </p:ext>
+    </p:extLst>
+  </p:cSld>
+  <p:clrMapOvr>
+    <a:masterClrMapping/>
+  </p:clrMapOvr>
+</p:sld>
+</file>
+
+<file path=ppt/slides/slide11.xml><?xml version="1.0" encoding="utf-8"?>
+<p:sld xmlns:a="http://schemas.openxmlformats.org/drawingml/2006/main" xmlns:r="http://schemas.openxmlformats.org/officeDocument/2006/relationships" xmlns:p="http://schemas.openxmlformats.org/presentationml/2006/main">
+  <p:cSld>
+    <p:spTree>
+      <p:nvGrpSpPr>
+        <p:cNvPr id="1" name=""/>
+        <p:cNvGrpSpPr/>
+        <p:nvPr/>
+      </p:nvGrpSpPr>
+      <p:grpSpPr>
+        <a:xfrm>
+          <a:off x="0" y="0"/>
+          <a:ext cx="0" cy="0"/>
+          <a:chOff x="0" y="0"/>
+          <a:chExt cx="0" cy="0"/>
+        </a:xfrm>
+      </p:grpSpPr>
+      <p:sp>
+        <p:nvSpPr>
+          <p:cNvPr id="2" name="Title 1">
+            <a:extLst>
+              <a:ext uri="{FF2B5EF4-FFF2-40B4-BE49-F238E27FC236}">
+                <a16:creationId xmlns:a16="http://schemas.microsoft.com/office/drawing/2014/main" id="{6D2D345F-59A5-43A7-98F6-8EEC97F73237}"/>
+              </a:ext>
+            </a:extLst>
+          </p:cNvPr>
+          <p:cNvSpPr>
+            <a:spLocks noGrp="1"/>
+          </p:cNvSpPr>
+          <p:nvPr>
+            <p:ph type="title"/>
+          </p:nvPr>
+        </p:nvSpPr>
+        <p:spPr/>
+        <p:txBody>
+          <a:bodyPr/>
+          <a:lstStyle/>
+          <a:p>
+            <a:r>
+              <a:rPr lang="en-US" dirty="0"/>
+              <a:t>Natural Language Processing</a:t>
+            </a:r>
+            <a:br>
+              <a:rPr lang="en-US" dirty="0"/>
+            </a:br>
+            <a:r>
+              <a:rPr lang="en-US" sz="2000" dirty="0">
+                <a:solidFill>
+                  <a:schemeClr val="tx1"/>
+                </a:solidFill>
+              </a:rPr>
+              <a:t>What are the Most Popular Word Pairs in Title? N-Grams (N = 2)</a:t>
+            </a:r>
+            <a:endParaRPr lang="en-US" sz="2000" dirty="0"/>
+          </a:p>
+        </p:txBody>
+      </p:sp>
+      <p:graphicFrame>
+        <p:nvGraphicFramePr>
+          <p:cNvPr id="7" name="Chart 6">
+            <a:extLst>
+              <a:ext uri="{FF2B5EF4-FFF2-40B4-BE49-F238E27FC236}">
+                <a16:creationId xmlns:a16="http://schemas.microsoft.com/office/drawing/2014/main" id="{D6B03F56-05BF-4D47-9231-4E18044709AF}"/>
+              </a:ext>
+            </a:extLst>
+          </p:cNvPr>
+          <p:cNvGraphicFramePr>
+            <a:graphicFrameLocks/>
+          </p:cNvGraphicFramePr>
+          <p:nvPr>
+            <p:extLst>
+              <p:ext uri="{D42A27DB-BD31-4B8C-83A1-F6EECF244321}">
+                <p14:modId xmlns:p14="http://schemas.microsoft.com/office/powerpoint/2010/main" val="275822075"/>
+              </p:ext>
+            </p:extLst>
+          </p:nvPr>
+        </p:nvGraphicFramePr>
+        <p:xfrm>
+          <a:off x="5206482" y="1647367"/>
+          <a:ext cx="4529147" cy="3951000"/>
+        </p:xfrm>
+        <a:graphic>
+          <a:graphicData uri="http://schemas.openxmlformats.org/drawingml/2006/chart">
+            <c:chart xmlns:c="http://schemas.openxmlformats.org/drawingml/2006/chart" xmlns:r="http://schemas.openxmlformats.org/officeDocument/2006/relationships" r:id="rId2"/>
+          </a:graphicData>
+        </a:graphic>
+      </p:graphicFrame>
+      <p:graphicFrame>
+        <p:nvGraphicFramePr>
+          <p:cNvPr id="8" name="Chart 7">
+            <a:extLst>
+              <a:ext uri="{FF2B5EF4-FFF2-40B4-BE49-F238E27FC236}">
+                <a16:creationId xmlns:a16="http://schemas.microsoft.com/office/drawing/2014/main" id="{725255FF-097B-40CD-A9D0-53F6A5D4AF54}"/>
+              </a:ext>
+            </a:extLst>
+          </p:cNvPr>
+          <p:cNvGraphicFramePr>
+            <a:graphicFrameLocks/>
+          </p:cNvGraphicFramePr>
+          <p:nvPr>
+            <p:extLst>
+              <p:ext uri="{D42A27DB-BD31-4B8C-83A1-F6EECF244321}">
+                <p14:modId xmlns:p14="http://schemas.microsoft.com/office/powerpoint/2010/main" val="620793883"/>
+              </p:ext>
+            </p:extLst>
+          </p:nvPr>
+        </p:nvGraphicFramePr>
+        <p:xfrm>
+          <a:off x="677335" y="1647367"/>
+          <a:ext cx="4529147" cy="3951000"/>
+        </p:xfrm>
+        <a:graphic>
+          <a:graphicData uri="http://schemas.openxmlformats.org/drawingml/2006/chart">
+            <c:chart xmlns:c="http://schemas.openxmlformats.org/drawingml/2006/chart" xmlns:r="http://schemas.openxmlformats.org/officeDocument/2006/relationships" r:id="rId3"/>
+          </a:graphicData>
+        </a:graphic>
+      </p:graphicFrame>
+    </p:spTree>
+    <p:extLst>
+      <p:ext uri="{BB962C8B-B14F-4D97-AF65-F5344CB8AC3E}">
+        <p14:creationId xmlns:p14="http://schemas.microsoft.com/office/powerpoint/2010/main" val="4165014472"/>
+      </p:ext>
+    </p:extLst>
+  </p:cSld>
+  <p:clrMapOvr>
+    <a:masterClrMapping/>
+  </p:clrMapOvr>
+</p:sld>
+</file>
+
+<file path=ppt/slides/slide12.xml><?xml version="1.0" encoding="utf-8"?>
+<p:sld xmlns:a="http://schemas.openxmlformats.org/drawingml/2006/main" xmlns:r="http://schemas.openxmlformats.org/officeDocument/2006/relationships" xmlns:p="http://schemas.openxmlformats.org/presentationml/2006/main">
+  <p:cSld>
+    <p:spTree>
+      <p:nvGrpSpPr>
+        <p:cNvPr id="1" name=""/>
+        <p:cNvGrpSpPr/>
+        <p:nvPr/>
+      </p:nvGrpSpPr>
+      <p:grpSpPr>
+        <a:xfrm>
+          <a:off x="0" y="0"/>
+          <a:ext cx="0" cy="0"/>
+          <a:chOff x="0" y="0"/>
+          <a:chExt cx="0" cy="0"/>
+        </a:xfrm>
+      </p:grpSpPr>
+      <p:sp>
+        <p:nvSpPr>
+          <p:cNvPr id="2" name="Title 1">
+            <a:extLst>
+              <a:ext uri="{FF2B5EF4-FFF2-40B4-BE49-F238E27FC236}">
+                <a16:creationId xmlns:a16="http://schemas.microsoft.com/office/drawing/2014/main" id="{6D2D345F-59A5-43A7-98F6-8EEC97F73237}"/>
+              </a:ext>
+            </a:extLst>
+          </p:cNvPr>
+          <p:cNvSpPr>
+            <a:spLocks noGrp="1"/>
+          </p:cNvSpPr>
+          <p:nvPr>
+            <p:ph type="title"/>
+          </p:nvPr>
+        </p:nvSpPr>
+        <p:spPr/>
+        <p:txBody>
+          <a:bodyPr/>
+          <a:lstStyle/>
+          <a:p>
+            <a:r>
+              <a:rPr lang="en-US" dirty="0"/>
+              <a:t>Natural Language Processing</a:t>
+            </a:r>
+            <a:br>
+              <a:rPr lang="en-US" dirty="0"/>
+            </a:br>
+            <a:r>
+              <a:rPr lang="en-US" sz="2000" dirty="0">
+                <a:solidFill>
+                  <a:schemeClr val="tx1"/>
+                </a:solidFill>
+              </a:rPr>
               <a:t>What are the Most Popular Word Triplets in Title? N-Grams (N = 3)</a:t>
             </a:r>
             <a:endParaRPr lang="en-US" sz="2000" dirty="0"/>
@@ -13137,7 +13399,7 @@
 </p:sld>
 </file>
 
-<file path=ppt/slides/slide11.xml><?xml version="1.0" encoding="utf-8"?>
+<file path=ppt/slides/slide13.xml><?xml version="1.0" encoding="utf-8"?>
 <p:sld xmlns:a="http://schemas.openxmlformats.org/drawingml/2006/main" xmlns:r="http://schemas.openxmlformats.org/officeDocument/2006/relationships" xmlns:p="http://schemas.openxmlformats.org/presentationml/2006/main">
   <p:cSld>
     <p:spTree>
@@ -13243,7 +13505,7 @@
 </p:sld>
 </file>
 
-<file path=ppt/slides/slide12.xml><?xml version="1.0" encoding="utf-8"?>
+<file path=ppt/slides/slide14.xml><?xml version="1.0" encoding="utf-8"?>
 <p:sld xmlns:a="http://schemas.openxmlformats.org/drawingml/2006/main" xmlns:r="http://schemas.openxmlformats.org/officeDocument/2006/relationships" xmlns:p="http://schemas.openxmlformats.org/presentationml/2006/main">
   <p:cSld>
     <p:spTree>
@@ -13316,7 +13578,51 @@
           <a:p>
             <a:r>
               <a:rPr lang="en-US" dirty="0"/>
-              <a:t>==</a:t>
+              <a:t>Automate extraction of papers from most prestigious conferences once they appear (e.g. send emails with a link to articles)</a:t>
+            </a:r>
+          </a:p>
+          <a:p>
+            <a:r>
+              <a:rPr lang="en-US" dirty="0"/>
+              <a:t>Apply machine learning methods for hierarchical topic modeling, e.g., Latent Dirichlet Allocation (LDA) using articles abstracts</a:t>
+            </a:r>
+          </a:p>
+          <a:p>
+            <a:pPr lvl="1"/>
+            <a:r>
+              <a:rPr lang="en-US" dirty="0"/>
+              <a:t>Implement a clustering model on articles</a:t>
+            </a:r>
+          </a:p>
+          <a:p>
+            <a:pPr lvl="1"/>
+            <a:r>
+              <a:rPr lang="en-US" dirty="0"/>
+              <a:t>Build a recommendation system that selects articles similar to specified based on clusters</a:t>
+            </a:r>
+          </a:p>
+          <a:p>
+            <a:r>
+              <a:rPr lang="en-US" dirty="0"/>
+              <a:t>Currently searching algorithm is very basic</a:t>
+            </a:r>
+          </a:p>
+          <a:p>
+            <a:pPr lvl="1"/>
+            <a:r>
+              <a:rPr lang="en-US" dirty="0"/>
+              <a:t>Implement an advanced version of algorithm ranking articles on different combinations </a:t>
+            </a:r>
+            <a:r>
+              <a:rPr lang="en-US"/>
+              <a:t>of keywords</a:t>
+            </a:r>
+            <a:endParaRPr lang="en-US" dirty="0"/>
+          </a:p>
+          <a:p>
+            <a:r>
+              <a:rPr lang="en-US" dirty="0"/>
+              <a:t>Improve scraping of google scholar to avoid being blocked</a:t>
             </a:r>
           </a:p>
         </p:txBody>
@@ -13958,6 +14264,170 @@
 </file>
 
 <file path=ppt/slides/slide6.xml><?xml version="1.0" encoding="utf-8"?>
+<p:sld xmlns:a="http://schemas.openxmlformats.org/drawingml/2006/main" xmlns:r="http://schemas.openxmlformats.org/officeDocument/2006/relationships" xmlns:p="http://schemas.openxmlformats.org/presentationml/2006/main">
+  <p:cSld>
+    <p:spTree>
+      <p:nvGrpSpPr>
+        <p:cNvPr id="1" name=""/>
+        <p:cNvGrpSpPr/>
+        <p:nvPr/>
+      </p:nvGrpSpPr>
+      <p:grpSpPr>
+        <a:xfrm>
+          <a:off x="0" y="0"/>
+          <a:ext cx="0" cy="0"/>
+          <a:chOff x="0" y="0"/>
+          <a:chExt cx="0" cy="0"/>
+        </a:xfrm>
+      </p:grpSpPr>
+      <p:sp>
+        <p:nvSpPr>
+          <p:cNvPr id="2" name="Title 1">
+            <a:extLst>
+              <a:ext uri="{FF2B5EF4-FFF2-40B4-BE49-F238E27FC236}">
+                <a16:creationId xmlns:a16="http://schemas.microsoft.com/office/drawing/2014/main" id="{6D2D345F-59A5-43A7-98F6-8EEC97F73237}"/>
+              </a:ext>
+            </a:extLst>
+          </p:cNvPr>
+          <p:cNvSpPr>
+            <a:spLocks noGrp="1"/>
+          </p:cNvSpPr>
+          <p:nvPr>
+            <p:ph type="title"/>
+          </p:nvPr>
+        </p:nvSpPr>
+        <p:spPr/>
+        <p:txBody>
+          <a:bodyPr/>
+          <a:lstStyle/>
+          <a:p>
+            <a:r>
+              <a:rPr lang="en-US" dirty="0"/>
+              <a:t>Citations Data</a:t>
+            </a:r>
+            <a:br>
+              <a:rPr lang="en-US" dirty="0"/>
+            </a:br>
+            <a:r>
+              <a:rPr lang="en-US" sz="2000" dirty="0">
+                <a:solidFill>
+                  <a:schemeClr val="tx1"/>
+                </a:solidFill>
+              </a:rPr>
+              <a:t>What are the Most Cited Authors?</a:t>
+            </a:r>
+            <a:endParaRPr lang="en-US" dirty="0"/>
+          </a:p>
+        </p:txBody>
+      </p:sp>
+      <p:sp>
+        <p:nvSpPr>
+          <p:cNvPr id="3" name="Content Placeholder 2">
+            <a:extLst>
+              <a:ext uri="{FF2B5EF4-FFF2-40B4-BE49-F238E27FC236}">
+                <a16:creationId xmlns:a16="http://schemas.microsoft.com/office/drawing/2014/main" id="{87E905CE-9DD7-4B91-8F98-E27CB40C9D3C}"/>
+              </a:ext>
+            </a:extLst>
+          </p:cNvPr>
+          <p:cNvSpPr>
+            <a:spLocks noGrp="1"/>
+          </p:cNvSpPr>
+          <p:nvPr>
+            <p:ph idx="1"/>
+          </p:nvPr>
+        </p:nvSpPr>
+        <p:spPr/>
+        <p:txBody>
+          <a:bodyPr/>
+          <a:lstStyle/>
+          <a:p>
+            <a:r>
+              <a:rPr lang="en-US" dirty="0"/>
+              <a:t>Name matching problem: author’s name is not a unique identifier, multiple authors can have the same name</a:t>
+            </a:r>
+          </a:p>
+          <a:p>
+            <a:r>
+              <a:rPr lang="en-US" dirty="0"/>
+              <a:t>Each author has a unique identifier google_scholar_id</a:t>
+            </a:r>
+          </a:p>
+          <a:p>
+            <a:pPr lvl="1"/>
+            <a:r>
+              <a:rPr lang="en-US" dirty="0"/>
+              <a:t>https://scholar.google.com/citations?user=</a:t>
+            </a:r>
+            <a:r>
+              <a:rPr lang="en-US" b="1" dirty="0"/>
+              <a:t>PoXHiS8AAAAJ&amp;hl=en&amp;oi=ao</a:t>
+            </a:r>
+            <a:endParaRPr lang="en-US" dirty="0"/>
+          </a:p>
+          <a:p>
+            <a:r>
+              <a:rPr lang="en-US" dirty="0"/>
+              <a:t>Below is a list of authors sorted by number of citations</a:t>
+            </a:r>
+          </a:p>
+          <a:p>
+            <a:pPr marL="0" indent="0">
+              <a:buNone/>
+            </a:pPr>
+            <a:endParaRPr lang="en-US" dirty="0"/>
+          </a:p>
+        </p:txBody>
+      </p:sp>
+      <p:pic>
+        <p:nvPicPr>
+          <p:cNvPr id="7" name="Picture 6">
+            <a:extLst>
+              <a:ext uri="{FF2B5EF4-FFF2-40B4-BE49-F238E27FC236}">
+                <a16:creationId xmlns:a16="http://schemas.microsoft.com/office/drawing/2014/main" id="{26A691E5-0F78-4FB9-9E3C-FB64EE3A16E3}"/>
+              </a:ext>
+            </a:extLst>
+          </p:cNvPr>
+          <p:cNvPicPr>
+            <a:picLocks noChangeAspect="1"/>
+          </p:cNvPicPr>
+          <p:nvPr/>
+        </p:nvPicPr>
+        <p:blipFill>
+          <a:blip r:embed="rId2">
+            <a:extLst>
+              <a:ext uri="{28A0092B-C50C-407E-A947-70E740481C1C}">
+                <a14:useLocalDpi xmlns:a14="http://schemas.microsoft.com/office/drawing/2010/main" val="0"/>
+              </a:ext>
+            </a:extLst>
+          </a:blip>
+          <a:stretch>
+            <a:fillRect/>
+          </a:stretch>
+        </p:blipFill>
+        <p:spPr>
+          <a:xfrm>
+            <a:off x="1078446" y="4100975"/>
+            <a:ext cx="4239217" cy="2734057"/>
+          </a:xfrm>
+          <a:prstGeom prst="rect">
+            <a:avLst/>
+          </a:prstGeom>
+        </p:spPr>
+      </p:pic>
+    </p:spTree>
+    <p:extLst>
+      <p:ext uri="{BB962C8B-B14F-4D97-AF65-F5344CB8AC3E}">
+        <p14:creationId xmlns:p14="http://schemas.microsoft.com/office/powerpoint/2010/main" val="2437431656"/>
+      </p:ext>
+    </p:extLst>
+  </p:cSld>
+  <p:clrMapOvr>
+    <a:masterClrMapping/>
+  </p:clrMapOvr>
+</p:sld>
+</file>
+
+<file path=ppt/slides/slide7.xml><?xml version="1.0" encoding="utf-8"?>
 <p:sld xmlns:a="http://schemas.openxmlformats.org/drawingml/2006/main" xmlns:r="http://schemas.openxmlformats.org/officeDocument/2006/relationships" xmlns:p="http://schemas.openxmlformats.org/presentationml/2006/main">
   <p:cSld>
     <p:spTree>
@@ -14533,106 +15003,6 @@
 </p:sld>
 </file>
 
-<file path=ppt/slides/slide7.xml><?xml version="1.0" encoding="utf-8"?>
-<p:sld xmlns:a="http://schemas.openxmlformats.org/drawingml/2006/main" xmlns:r="http://schemas.openxmlformats.org/officeDocument/2006/relationships" xmlns:p="http://schemas.openxmlformats.org/presentationml/2006/main">
-  <p:cSld>
-    <p:spTree>
-      <p:nvGrpSpPr>
-        <p:cNvPr id="1" name=""/>
-        <p:cNvGrpSpPr/>
-        <p:nvPr/>
-      </p:nvGrpSpPr>
-      <p:grpSpPr>
-        <a:xfrm>
-          <a:off x="0" y="0"/>
-          <a:ext cx="0" cy="0"/>
-          <a:chOff x="0" y="0"/>
-          <a:chExt cx="0" cy="0"/>
-        </a:xfrm>
-      </p:grpSpPr>
-      <p:sp>
-        <p:nvSpPr>
-          <p:cNvPr id="2" name="Title 1">
-            <a:extLst>
-              <a:ext uri="{FF2B5EF4-FFF2-40B4-BE49-F238E27FC236}">
-                <a16:creationId xmlns:a16="http://schemas.microsoft.com/office/drawing/2014/main" id="{6D2D345F-59A5-43A7-98F6-8EEC97F73237}"/>
-              </a:ext>
-            </a:extLst>
-          </p:cNvPr>
-          <p:cNvSpPr>
-            <a:spLocks noGrp="1"/>
-          </p:cNvSpPr>
-          <p:nvPr>
-            <p:ph type="title"/>
-          </p:nvPr>
-        </p:nvSpPr>
-        <p:spPr/>
-        <p:txBody>
-          <a:bodyPr/>
-          <a:lstStyle/>
-          <a:p>
-            <a:r>
-              <a:rPr lang="en-US" dirty="0"/>
-              <a:t>Natural Language Processing</a:t>
-            </a:r>
-            <a:br>
-              <a:rPr lang="en-US" dirty="0"/>
-            </a:br>
-            <a:r>
-              <a:rPr lang="en-US" sz="2000" dirty="0">
-                <a:solidFill>
-                  <a:schemeClr val="tx1"/>
-                </a:solidFill>
-              </a:rPr>
-              <a:t>What are the Most Popular Authors by Number of Articles?</a:t>
-            </a:r>
-            <a:endParaRPr lang="en-US" sz="2000" dirty="0"/>
-          </a:p>
-        </p:txBody>
-      </p:sp>
-      <p:graphicFrame>
-        <p:nvGraphicFramePr>
-          <p:cNvPr id="4" name="Chart 3">
-            <a:extLst>
-              <a:ext uri="{FF2B5EF4-FFF2-40B4-BE49-F238E27FC236}">
-                <a16:creationId xmlns:a16="http://schemas.microsoft.com/office/drawing/2014/main" id="{F7E42CFD-0A8C-4171-930A-EDD9EE1EF75A}"/>
-              </a:ext>
-            </a:extLst>
-          </p:cNvPr>
-          <p:cNvGraphicFramePr>
-            <a:graphicFrameLocks/>
-          </p:cNvGraphicFramePr>
-          <p:nvPr>
-            <p:extLst>
-              <p:ext uri="{D42A27DB-BD31-4B8C-83A1-F6EECF244321}">
-                <p14:modId xmlns:p14="http://schemas.microsoft.com/office/powerpoint/2010/main" val="407623878"/>
-              </p:ext>
-            </p:extLst>
-          </p:nvPr>
-        </p:nvGraphicFramePr>
-        <p:xfrm>
-          <a:off x="677333" y="1663876"/>
-          <a:ext cx="5760789" cy="4643614"/>
-        </p:xfrm>
-        <a:graphic>
-          <a:graphicData uri="http://schemas.openxmlformats.org/drawingml/2006/chart">
-            <c:chart xmlns:c="http://schemas.openxmlformats.org/drawingml/2006/chart" xmlns:r="http://schemas.openxmlformats.org/officeDocument/2006/relationships" r:id="rId2"/>
-          </a:graphicData>
-        </a:graphic>
-      </p:graphicFrame>
-    </p:spTree>
-    <p:extLst>
-      <p:ext uri="{BB962C8B-B14F-4D97-AF65-F5344CB8AC3E}">
-        <p14:creationId xmlns:p14="http://schemas.microsoft.com/office/powerpoint/2010/main" val="1228367063"/>
-      </p:ext>
-    </p:extLst>
-  </p:cSld>
-  <p:clrMapOvr>
-    <a:masterClrMapping/>
-  </p:clrMapOvr>
-</p:sld>
-</file>
-
 <file path=ppt/slides/slide8.xml><?xml version="1.0" encoding="utf-8"?>
 <p:sld xmlns:a="http://schemas.openxmlformats.org/drawingml/2006/main" xmlns:r="http://schemas.openxmlformats.org/officeDocument/2006/relationships" xmlns:p="http://schemas.openxmlformats.org/presentationml/2006/main">
   <p:cSld>
@@ -14684,76 +15054,100 @@
                   <a:schemeClr val="tx1"/>
                 </a:solidFill>
               </a:rPr>
-              <a:t>What are the Most Popular Words in Title? N-Grams (N = 1)</a:t>
-            </a:r>
-            <a:endParaRPr lang="en-US" sz="2000" dirty="0"/>
+              <a:t>Searching Articles by Keywords</a:t>
+            </a:r>
+            <a:endParaRPr lang="en-US" dirty="0"/>
           </a:p>
         </p:txBody>
       </p:sp>
-      <p:graphicFrame>
-        <p:nvGraphicFramePr>
-          <p:cNvPr id="5" name="Chart 4">
+      <p:sp>
+        <p:nvSpPr>
+          <p:cNvPr id="3" name="Content Placeholder 2">
             <a:extLst>
               <a:ext uri="{FF2B5EF4-FFF2-40B4-BE49-F238E27FC236}">
-                <a16:creationId xmlns:a16="http://schemas.microsoft.com/office/drawing/2014/main" id="{D9A3A95F-5B2C-44ED-93CA-5DB3C07D4760}"/>
+                <a16:creationId xmlns:a16="http://schemas.microsoft.com/office/drawing/2014/main" id="{87E905CE-9DD7-4B91-8F98-E27CB40C9D3C}"/>
               </a:ext>
             </a:extLst>
           </p:cNvPr>
-          <p:cNvGraphicFramePr>
-            <a:graphicFrameLocks/>
-          </p:cNvGraphicFramePr>
+          <p:cNvSpPr>
+            <a:spLocks noGrp="1"/>
+          </p:cNvSpPr>
           <p:nvPr>
-            <p:extLst>
-              <p:ext uri="{D42A27DB-BD31-4B8C-83A1-F6EECF244321}">
-                <p14:modId xmlns:p14="http://schemas.microsoft.com/office/powerpoint/2010/main" val="1447746438"/>
-              </p:ext>
-            </p:extLst>
+            <p:ph idx="1"/>
           </p:nvPr>
-        </p:nvGraphicFramePr>
-        <p:xfrm>
-          <a:off x="677335" y="1647366"/>
-          <a:ext cx="4529147" cy="3951001"/>
-        </p:xfrm>
-        <a:graphic>
-          <a:graphicData uri="http://schemas.openxmlformats.org/drawingml/2006/chart">
-            <c:chart xmlns:c="http://schemas.openxmlformats.org/drawingml/2006/chart" xmlns:r="http://schemas.openxmlformats.org/officeDocument/2006/relationships" r:id="rId2"/>
-          </a:graphicData>
-        </a:graphic>
-      </p:graphicFrame>
-      <p:graphicFrame>
-        <p:nvGraphicFramePr>
-          <p:cNvPr id="6" name="Chart 5">
+        </p:nvSpPr>
+        <p:spPr/>
+        <p:txBody>
+          <a:bodyPr/>
+          <a:lstStyle/>
+          <a:p>
+            <a:r>
+              <a:rPr lang="en-US" dirty="0"/>
+              <a:t>For a given keywords in string format – find articles containing it</a:t>
+            </a:r>
+          </a:p>
+          <a:p>
+            <a:pPr lvl="1"/>
+            <a:r>
+              <a:rPr lang="en-US" dirty="0"/>
+              <a:t>Optionality of searching in articles titles and abstracts</a:t>
+            </a:r>
+          </a:p>
+          <a:p>
+            <a:pPr lvl="1"/>
+            <a:r>
+              <a:rPr lang="en-US" dirty="0"/>
+              <a:t>The articles should be sorted in descending order by number of citations </a:t>
+            </a:r>
+          </a:p>
+          <a:p>
+            <a:pPr marL="0" indent="0">
+              <a:buNone/>
+            </a:pPr>
+            <a:endParaRPr lang="en-US" dirty="0"/>
+          </a:p>
+        </p:txBody>
+      </p:sp>
+      <p:pic>
+        <p:nvPicPr>
+          <p:cNvPr id="5" name="Picture 4">
             <a:extLst>
               <a:ext uri="{FF2B5EF4-FFF2-40B4-BE49-F238E27FC236}">
-                <a16:creationId xmlns:a16="http://schemas.microsoft.com/office/drawing/2014/main" id="{F5BEA849-033A-498F-BF9F-A6C8CFF82B89}"/>
+                <a16:creationId xmlns:a16="http://schemas.microsoft.com/office/drawing/2014/main" id="{9878D00C-8CB7-4D4F-B383-093280ED7C54}"/>
               </a:ext>
             </a:extLst>
           </p:cNvPr>
-          <p:cNvGraphicFramePr>
-            <a:graphicFrameLocks/>
-          </p:cNvGraphicFramePr>
-          <p:nvPr>
-            <p:extLst>
-              <p:ext uri="{D42A27DB-BD31-4B8C-83A1-F6EECF244321}">
-                <p14:modId xmlns:p14="http://schemas.microsoft.com/office/powerpoint/2010/main" val="2239648938"/>
-              </p:ext>
-            </p:extLst>
-          </p:nvPr>
-        </p:nvGraphicFramePr>
-        <p:xfrm>
-          <a:off x="5206482" y="1647365"/>
-          <a:ext cx="4529149" cy="3951001"/>
-        </p:xfrm>
-        <a:graphic>
-          <a:graphicData uri="http://schemas.openxmlformats.org/drawingml/2006/chart">
-            <c:chart xmlns:c="http://schemas.openxmlformats.org/drawingml/2006/chart" xmlns:r="http://schemas.openxmlformats.org/officeDocument/2006/relationships" r:id="rId3"/>
-          </a:graphicData>
-        </a:graphic>
-      </p:graphicFrame>
+          <p:cNvPicPr>
+            <a:picLocks noChangeAspect="1"/>
+          </p:cNvPicPr>
+          <p:nvPr/>
+        </p:nvPicPr>
+        <p:blipFill>
+          <a:blip r:embed="rId2">
+            <a:extLst>
+              <a:ext uri="{28A0092B-C50C-407E-A947-70E740481C1C}">
+                <a14:useLocalDpi xmlns:a14="http://schemas.microsoft.com/office/drawing/2010/main" val="0"/>
+              </a:ext>
+            </a:extLst>
+          </a:blip>
+          <a:stretch>
+            <a:fillRect/>
+          </a:stretch>
+        </p:blipFill>
+        <p:spPr>
+          <a:xfrm>
+            <a:off x="893903" y="3428999"/>
+            <a:ext cx="8168154" cy="2842551"/>
+          </a:xfrm>
+          <a:prstGeom prst="rect">
+            <a:avLst/>
+          </a:prstGeom>
+        </p:spPr>
+      </p:pic>
     </p:spTree>
     <p:extLst>
       <p:ext uri="{BB962C8B-B14F-4D97-AF65-F5344CB8AC3E}">
-        <p14:creationId xmlns:p14="http://schemas.microsoft.com/office/powerpoint/2010/main" val="3151245089"/>
+        <p14:creationId xmlns:p14="http://schemas.microsoft.com/office/powerpoint/2010/main" val="619144187"/>
       </p:ext>
     </p:extLst>
   </p:cSld>
@@ -14814,7 +15208,7 @@
                   <a:schemeClr val="tx1"/>
                 </a:solidFill>
               </a:rPr>
-              <a:t>What are the Most Popular Word Pairs in Title? N-Grams (N = 2)</a:t>
+              <a:t>What are the Most Popular Authors by Number of Articles?</a:t>
             </a:r>
             <a:endParaRPr lang="en-US" sz="2000" dirty="0"/>
           </a:p>
@@ -14822,10 +15216,10 @@
       </p:sp>
       <p:graphicFrame>
         <p:nvGraphicFramePr>
-          <p:cNvPr id="7" name="Chart 6">
+          <p:cNvPr id="4" name="Chart 3">
             <a:extLst>
               <a:ext uri="{FF2B5EF4-FFF2-40B4-BE49-F238E27FC236}">
-                <a16:creationId xmlns:a16="http://schemas.microsoft.com/office/drawing/2014/main" id="{D6B03F56-05BF-4D47-9231-4E18044709AF}"/>
+                <a16:creationId xmlns:a16="http://schemas.microsoft.com/office/drawing/2014/main" id="{F7E42CFD-0A8C-4171-930A-EDD9EE1EF75A}"/>
               </a:ext>
             </a:extLst>
           </p:cNvPr>
@@ -14835,14 +15229,14 @@
           <p:nvPr>
             <p:extLst>
               <p:ext uri="{D42A27DB-BD31-4B8C-83A1-F6EECF244321}">
-                <p14:modId xmlns:p14="http://schemas.microsoft.com/office/powerpoint/2010/main" val="275822075"/>
+                <p14:modId xmlns:p14="http://schemas.microsoft.com/office/powerpoint/2010/main" val="407623878"/>
               </p:ext>
             </p:extLst>
           </p:nvPr>
         </p:nvGraphicFramePr>
         <p:xfrm>
-          <a:off x="5206482" y="1647367"/>
-          <a:ext cx="4529147" cy="3951000"/>
+          <a:off x="677333" y="1663876"/>
+          <a:ext cx="5760789" cy="4643614"/>
         </p:xfrm>
         <a:graphic>
           <a:graphicData uri="http://schemas.openxmlformats.org/drawingml/2006/chart">
@@ -14850,40 +15244,10 @@
           </a:graphicData>
         </a:graphic>
       </p:graphicFrame>
-      <p:graphicFrame>
-        <p:nvGraphicFramePr>
-          <p:cNvPr id="8" name="Chart 7">
-            <a:extLst>
-              <a:ext uri="{FF2B5EF4-FFF2-40B4-BE49-F238E27FC236}">
-                <a16:creationId xmlns:a16="http://schemas.microsoft.com/office/drawing/2014/main" id="{725255FF-097B-40CD-A9D0-53F6A5D4AF54}"/>
-              </a:ext>
-            </a:extLst>
-          </p:cNvPr>
-          <p:cNvGraphicFramePr>
-            <a:graphicFrameLocks/>
-          </p:cNvGraphicFramePr>
-          <p:nvPr>
-            <p:extLst>
-              <p:ext uri="{D42A27DB-BD31-4B8C-83A1-F6EECF244321}">
-                <p14:modId xmlns:p14="http://schemas.microsoft.com/office/powerpoint/2010/main" val="620793883"/>
-              </p:ext>
-            </p:extLst>
-          </p:nvPr>
-        </p:nvGraphicFramePr>
-        <p:xfrm>
-          <a:off x="677335" y="1647367"/>
-          <a:ext cx="4529147" cy="3951000"/>
-        </p:xfrm>
-        <a:graphic>
-          <a:graphicData uri="http://schemas.openxmlformats.org/drawingml/2006/chart">
-            <c:chart xmlns:c="http://schemas.openxmlformats.org/drawingml/2006/chart" xmlns:r="http://schemas.openxmlformats.org/officeDocument/2006/relationships" r:id="rId3"/>
-          </a:graphicData>
-        </a:graphic>
-      </p:graphicFrame>
     </p:spTree>
     <p:extLst>
       <p:ext uri="{BB962C8B-B14F-4D97-AF65-F5344CB8AC3E}">
-        <p14:creationId xmlns:p14="http://schemas.microsoft.com/office/powerpoint/2010/main" val="4165014472"/>
+        <p14:creationId xmlns:p14="http://schemas.microsoft.com/office/powerpoint/2010/main" val="1228367063"/>
       </p:ext>
     </p:extLst>
   </p:cSld>

</xml_diff>